<commit_message>
Chapters 2 and 3 revised
</commit_message>
<xml_diff>
--- a/CubiertaTesisA4_general.pptx
+++ b/CubiertaTesisA4_general.pptx
@@ -62,7 +62,9 @@
             <a:noAutofit/>
           </a:bodyPr>
           <a:p>
-            <a:pPr algn="ctr"/>
+            <a:pPr algn="ctr">
+              <a:buNone/>
+            </a:pPr>
             <a:r>
               <a:rPr b="0" lang="en-US" sz="4400" spc="-1" strike="noStrike">
                 <a:latin typeface="Arial"/>
@@ -225,7 +227,9 @@
             <a:noAutofit/>
           </a:bodyPr>
           <a:p>
-            <a:pPr algn="r"/>
+            <a:pPr algn="r">
+              <a:buNone/>
+            </a:pPr>
             <a:r>
               <a:rPr b="0" lang="en-US" sz="1400" spc="-1" strike="noStrike">
                 <a:latin typeface="Times New Roman"/>
@@ -306,8 +310,10 @@
             <a:noAutofit/>
           </a:bodyPr>
           <a:p>
-            <a:pPr algn="r"/>
-            <a:fld id="{D895E5D4-2171-4D43-8FCF-83390B370A67}" type="slidenum">
+            <a:pPr algn="r">
+              <a:buNone/>
+            </a:pPr>
+            <a:fld id="{C7049FCA-0978-42BB-8EC7-CA90F81B11A9}" type="slidenum">
               <a:rPr b="0" lang="en-US" sz="1400" spc="-1" strike="noStrike">
                 <a:latin typeface="Times New Roman"/>
               </a:rPr>
@@ -355,7 +361,7 @@
         <p:spPr>
           <a:xfrm>
             <a:off x="2376360" y="1143000"/>
-            <a:ext cx="2103480" cy="3084840"/>
+            <a:ext cx="2103120" cy="3084480"/>
           </a:xfrm>
           <a:prstGeom prst="rect">
             <a:avLst/>
@@ -378,7 +384,7 @@
         <p:spPr>
           <a:xfrm>
             <a:off x="685800" y="4400640"/>
-            <a:ext cx="5484960" cy="3598920"/>
+            <a:ext cx="5484600" cy="3598560"/>
           </a:xfrm>
           <a:prstGeom prst="rect">
             <a:avLst/>
@@ -412,7 +418,7 @@
         <p:spPr>
           <a:xfrm>
             <a:off x="3884760" y="8685360"/>
-            <a:ext cx="2970360" cy="457200"/>
+            <a:ext cx="2970000" cy="456840"/>
           </a:xfrm>
           <a:prstGeom prst="rect">
             <a:avLst/>
@@ -431,8 +437,9 @@
               <a:lnSpc>
                 <a:spcPct val="100000"/>
               </a:lnSpc>
-            </a:pPr>
-            <a:fld id="{1ACB332C-A683-4367-8028-64C38EB0EB6D}" type="slidenum">
+              <a:buNone/>
+            </a:pPr>
+            <a:fld id="{CD9F758B-D9BD-4DF6-866C-4AAEF4A73745}" type="slidenum">
               <a:rPr b="0" lang="es-ES" sz="1200" spc="-1" strike="noStrike">
                 <a:latin typeface="Times New Roman"/>
               </a:rPr>
@@ -479,7 +486,7 @@
         <p:spPr>
           <a:xfrm>
             <a:off x="2376360" y="1143000"/>
-            <a:ext cx="2103480" cy="3084840"/>
+            <a:ext cx="2103120" cy="3084480"/>
           </a:xfrm>
           <a:prstGeom prst="rect">
             <a:avLst/>
@@ -502,7 +509,7 @@
         <p:spPr>
           <a:xfrm>
             <a:off x="685800" y="4400640"/>
-            <a:ext cx="5484960" cy="3598920"/>
+            <a:ext cx="5484600" cy="3598560"/>
           </a:xfrm>
           <a:prstGeom prst="rect">
             <a:avLst/>
@@ -536,7 +543,7 @@
         <p:spPr>
           <a:xfrm>
             <a:off x="3884760" y="8685360"/>
-            <a:ext cx="2970360" cy="457200"/>
+            <a:ext cx="2970000" cy="456840"/>
           </a:xfrm>
           <a:prstGeom prst="rect">
             <a:avLst/>
@@ -555,8 +562,9 @@
               <a:lnSpc>
                 <a:spcPct val="100000"/>
               </a:lnSpc>
-            </a:pPr>
-            <a:fld id="{5E8F2E62-E3E6-4D40-94D5-680FB73A67C8}" type="slidenum">
+              <a:buNone/>
+            </a:pPr>
+            <a:fld id="{2C0244F0-4E8F-477F-AFE6-5EEA2D2BCE6E}" type="slidenum">
               <a:rPr b="0" lang="es-ES" sz="1200" spc="-1" strike="noStrike">
                 <a:latin typeface="Times New Roman"/>
               </a:rPr>
@@ -603,7 +611,7 @@
         <p:spPr>
           <a:xfrm>
             <a:off x="2376360" y="1143000"/>
-            <a:ext cx="2103480" cy="3084840"/>
+            <a:ext cx="2103120" cy="3084480"/>
           </a:xfrm>
           <a:prstGeom prst="rect">
             <a:avLst/>
@@ -626,7 +634,7 @@
         <p:spPr>
           <a:xfrm>
             <a:off x="685800" y="4400640"/>
-            <a:ext cx="5484960" cy="3598920"/>
+            <a:ext cx="5484600" cy="3598560"/>
           </a:xfrm>
           <a:prstGeom prst="rect">
             <a:avLst/>
@@ -660,7 +668,7 @@
         <p:spPr>
           <a:xfrm>
             <a:off x="3884760" y="8685360"/>
-            <a:ext cx="2970360" cy="457200"/>
+            <a:ext cx="2970000" cy="456840"/>
           </a:xfrm>
           <a:prstGeom prst="rect">
             <a:avLst/>
@@ -679,8 +687,9 @@
               <a:lnSpc>
                 <a:spcPct val="100000"/>
               </a:lnSpc>
-            </a:pPr>
-            <a:fld id="{08817A56-BAF6-485F-863B-CDF20602C6EC}" type="slidenum">
+              <a:buNone/>
+            </a:pPr>
+            <a:fld id="{949CF0F7-3F35-49A7-8773-0FDCCA65F741}" type="slidenum">
               <a:rPr b="0" lang="es-ES" sz="1200" spc="-1" strike="noStrike">
                 <a:latin typeface="Times New Roman"/>
               </a:rPr>
@@ -764,7 +773,9 @@
             <a:noAutofit/>
           </a:bodyPr>
           <a:p>
-            <a:pPr algn="ctr"/>
+            <a:pPr algn="ctr">
+              <a:buNone/>
+            </a:pPr>
             <a:endParaRPr b="0" lang="en-US" sz="4400" spc="-1" strike="noStrike">
               <a:latin typeface="Arial"/>
             </a:endParaRPr>
@@ -889,7 +900,9 @@
             <a:noAutofit/>
           </a:bodyPr>
           <a:p>
-            <a:pPr algn="ctr"/>
+            <a:pPr algn="ctr">
+              <a:buNone/>
+            </a:pPr>
             <a:endParaRPr b="0" lang="en-US" sz="4400" spc="-1" strike="noStrike">
               <a:latin typeface="Arial"/>
             </a:endParaRPr>
@@ -1082,7 +1095,9 @@
             <a:noAutofit/>
           </a:bodyPr>
           <a:p>
-            <a:pPr algn="ctr"/>
+            <a:pPr algn="ctr">
+              <a:buNone/>
+            </a:pPr>
             <a:endParaRPr b="0" lang="en-US" sz="4400" spc="-1" strike="noStrike">
               <a:latin typeface="Arial"/>
             </a:endParaRPr>
@@ -1343,7 +1358,9 @@
             <a:noAutofit/>
           </a:bodyPr>
           <a:p>
-            <a:pPr algn="ctr"/>
+            <a:pPr algn="ctr">
+              <a:buNone/>
+            </a:pPr>
             <a:endParaRPr b="0" lang="en-US" sz="4400" spc="-1" strike="noStrike">
               <a:latin typeface="Arial"/>
             </a:endParaRPr>
@@ -1378,7 +1395,9 @@
             <a:noAutofit/>
           </a:bodyPr>
           <a:p>
-            <a:pPr algn="ctr"/>
+            <a:pPr algn="ctr">
+              <a:buNone/>
+            </a:pPr>
             <a:endParaRPr b="0" lang="en-US" sz="3200" spc="-1" strike="noStrike">
               <a:latin typeface="Arial"/>
             </a:endParaRPr>
@@ -1435,7 +1454,9 @@
             <a:noAutofit/>
           </a:bodyPr>
           <a:p>
-            <a:pPr algn="ctr"/>
+            <a:pPr algn="ctr">
+              <a:buNone/>
+            </a:pPr>
             <a:endParaRPr b="0" lang="en-US" sz="4400" spc="-1" strike="noStrike">
               <a:latin typeface="Arial"/>
             </a:endParaRPr>
@@ -1526,7 +1547,9 @@
             <a:noAutofit/>
           </a:bodyPr>
           <a:p>
-            <a:pPr algn="ctr"/>
+            <a:pPr algn="ctr">
+              <a:buNone/>
+            </a:pPr>
             <a:endParaRPr b="0" lang="en-US" sz="4400" spc="-1" strike="noStrike">
               <a:latin typeface="Arial"/>
             </a:endParaRPr>
@@ -1651,7 +1674,9 @@
             <a:noAutofit/>
           </a:bodyPr>
           <a:p>
-            <a:pPr algn="ctr"/>
+            <a:pPr algn="ctr">
+              <a:buNone/>
+            </a:pPr>
             <a:endParaRPr b="0" lang="en-US" sz="4400" spc="-1" strike="noStrike">
               <a:latin typeface="Arial"/>
             </a:endParaRPr>
@@ -1708,7 +1733,9 @@
             <a:noAutofit/>
           </a:bodyPr>
           <a:p>
-            <a:pPr algn="ctr"/>
+            <a:pPr algn="ctr">
+              <a:buNone/>
+            </a:pPr>
             <a:endParaRPr b="0" lang="en-US" sz="3200" spc="-1" strike="noStrike">
               <a:latin typeface="Arial"/>
             </a:endParaRPr>
@@ -1765,7 +1792,9 @@
             <a:noAutofit/>
           </a:bodyPr>
           <a:p>
-            <a:pPr algn="ctr"/>
+            <a:pPr algn="ctr">
+              <a:buNone/>
+            </a:pPr>
             <a:endParaRPr b="0" lang="en-US" sz="4400" spc="-1" strike="noStrike">
               <a:latin typeface="Arial"/>
             </a:endParaRPr>
@@ -1924,7 +1953,9 @@
             <a:noAutofit/>
           </a:bodyPr>
           <a:p>
-            <a:pPr algn="ctr"/>
+            <a:pPr algn="ctr">
+              <a:buNone/>
+            </a:pPr>
             <a:endParaRPr b="0" lang="en-US" sz="4400" spc="-1" strike="noStrike">
               <a:latin typeface="Arial"/>
             </a:endParaRPr>
@@ -2083,7 +2114,9 @@
             <a:noAutofit/>
           </a:bodyPr>
           <a:p>
-            <a:pPr algn="ctr"/>
+            <a:pPr algn="ctr">
+              <a:buNone/>
+            </a:pPr>
             <a:endParaRPr b="0" lang="en-US" sz="4400" spc="-1" strike="noStrike">
               <a:latin typeface="Arial"/>
             </a:endParaRPr>
@@ -2249,18 +2282,14 @@
             <a:noAutofit/>
           </a:bodyPr>
           <a:p>
-            <a:pPr algn="ctr"/>
+            <a:pPr algn="ctr">
+              <a:buNone/>
+            </a:pPr>
             <a:r>
               <a:rPr b="0" lang="en-US" sz="4400" spc="-1" strike="noStrike">
                 <a:latin typeface="Arial"/>
               </a:rPr>
-              <a:t>Click to edit the title </a:t>
-            </a:r>
-            <a:r>
-              <a:rPr b="0" lang="en-US" sz="4400" spc="-1" strike="noStrike">
-                <a:latin typeface="Arial"/>
-              </a:rPr>
-              <a:t>text format</a:t>
+              <a:t>Click to edit the title text format</a:t>
             </a:r>
             <a:endParaRPr b="0" lang="en-US" sz="4400" spc="-1" strike="noStrike">
               <a:latin typeface="Arial"/>
@@ -2504,7 +2533,7 @@
         <p:spPr>
           <a:xfrm>
             <a:off x="0" y="1248840"/>
-            <a:ext cx="8358120" cy="502560"/>
+            <a:ext cx="8357760" cy="502200"/>
           </a:xfrm>
           <a:prstGeom prst="rect">
             <a:avLst/>
@@ -2543,8 +2572,8 @@
         </p:blipFill>
         <p:spPr>
           <a:xfrm rot="10800000">
-            <a:off x="515160" y="6443640"/>
-            <a:ext cx="1510560" cy="1475640"/>
+            <a:off x="515520" y="6444000"/>
+            <a:ext cx="1510200" cy="1475280"/>
           </a:xfrm>
           <a:prstGeom prst="rect">
             <a:avLst/>
@@ -2563,7 +2592,7 @@
         <p:spPr>
           <a:xfrm>
             <a:off x="43200" y="719280"/>
-            <a:ext cx="7630560" cy="10798560"/>
+            <a:ext cx="7630200" cy="10798200"/>
           </a:xfrm>
           <a:prstGeom prst="rect">
             <a:avLst/>
@@ -2592,7 +2621,7 @@
         <p:spPr>
           <a:xfrm>
             <a:off x="441720" y="1294560"/>
-            <a:ext cx="6710040" cy="424440"/>
+            <a:ext cx="6709680" cy="424440"/>
           </a:xfrm>
           <a:prstGeom prst="rect">
             <a:avLst/>
@@ -2617,6 +2646,7 @@
               <a:lnSpc>
                 <a:spcPct val="100000"/>
               </a:lnSpc>
+              <a:buNone/>
             </a:pPr>
             <a:r>
               <a:rPr b="1" lang="es-ES" sz="1100" spc="-1" strike="noStrike">
@@ -2647,6 +2677,7 @@
               <a:lnSpc>
                 <a:spcPct val="100000"/>
               </a:lnSpc>
+              <a:buNone/>
             </a:pPr>
             <a:endParaRPr b="0" lang="en-US" sz="1100" spc="-1" strike="noStrike">
               <a:latin typeface="Arial"/>
@@ -2663,7 +2694,7 @@
         <p:spPr>
           <a:xfrm>
             <a:off x="1017720" y="6439320"/>
-            <a:ext cx="790560" cy="259920"/>
+            <a:ext cx="790200" cy="259920"/>
           </a:xfrm>
           <a:prstGeom prst="rect">
             <a:avLst/>
@@ -2688,6 +2719,7 @@
               <a:lnSpc>
                 <a:spcPct val="100000"/>
               </a:lnSpc>
+              <a:buNone/>
             </a:pPr>
             <a:r>
               <a:rPr b="0" lang="es-ES" sz="1000" spc="-1" strike="noStrike">
@@ -2714,7 +2746,7 @@
         <p:spPr>
           <a:xfrm>
             <a:off x="729720" y="3310920"/>
-            <a:ext cx="5899680" cy="3272760"/>
+            <a:ext cx="5899320" cy="3272760"/>
           </a:xfrm>
           <a:prstGeom prst="rect">
             <a:avLst/>
@@ -2742,6 +2774,7 @@
               <a:spcAft>
                 <a:spcPts val="1199"/>
               </a:spcAft>
+              <a:buNone/>
             </a:pPr>
             <a:r>
               <a:rPr b="0" lang="es-ES" sz="1000" spc="-1" strike="noStrike">
@@ -2765,6 +2798,7 @@
               <a:spcAft>
                 <a:spcPts val="1199"/>
               </a:spcAft>
+              <a:buNone/>
             </a:pPr>
             <a:r>
               <a:rPr b="0" lang="es-ES" sz="1600" spc="-1" strike="noStrike">
@@ -2788,6 +2822,7 @@
               <a:spcAft>
                 <a:spcPts val="1199"/>
               </a:spcAft>
+              <a:buNone/>
             </a:pPr>
             <a:r>
               <a:rPr b="0" lang="es-ES" sz="1000" spc="-1" strike="noStrike">
@@ -2821,6 +2856,7 @@
               <a:spcAft>
                 <a:spcPts val="1199"/>
               </a:spcAft>
+              <a:buNone/>
             </a:pPr>
             <a:r>
               <a:rPr b="0" lang="es-ES" sz="1600" spc="-1" strike="noStrike">
@@ -2844,6 +2880,7 @@
               <a:spcAft>
                 <a:spcPts val="1199"/>
               </a:spcAft>
+              <a:buNone/>
             </a:pPr>
             <a:endParaRPr b="0" lang="en-US" sz="1600" spc="-1" strike="noStrike">
               <a:latin typeface="Arial"/>
@@ -2857,6 +2894,7 @@
               <a:spcAft>
                 <a:spcPts val="1199"/>
               </a:spcAft>
+              <a:buNone/>
             </a:pPr>
             <a:endParaRPr b="0" lang="en-US" sz="1600" spc="-1" strike="noStrike">
               <a:latin typeface="Arial"/>
@@ -2867,6 +2905,7 @@
               <a:lnSpc>
                 <a:spcPct val="100000"/>
               </a:lnSpc>
+              <a:buNone/>
             </a:pPr>
             <a:endParaRPr b="0" lang="en-US" sz="1600" spc="-1" strike="noStrike">
               <a:latin typeface="Arial"/>
@@ -2883,7 +2922,7 @@
         <p:spPr>
           <a:xfrm>
             <a:off x="1017720" y="6439320"/>
-            <a:ext cx="5899680" cy="1523880"/>
+            <a:ext cx="5899320" cy="1523880"/>
           </a:xfrm>
           <a:prstGeom prst="rect">
             <a:avLst/>
@@ -2911,6 +2950,7 @@
               <a:spcAft>
                 <a:spcPts val="601"/>
               </a:spcAft>
+              <a:buNone/>
             </a:pPr>
             <a:r>
               <a:rPr b="0" lang="es-ES" sz="1000" spc="-1" strike="noStrike">
@@ -2934,6 +2974,7 @@
               <a:spcAft>
                 <a:spcPts val="601"/>
               </a:spcAft>
+              <a:buNone/>
             </a:pPr>
             <a:r>
               <a:rPr b="0" lang="es-ES" sz="1200" spc="-1" strike="noStrike" cap="small">
@@ -2957,6 +2998,7 @@
               <a:spcAft>
                 <a:spcPts val="601"/>
               </a:spcAft>
+              <a:buNone/>
             </a:pPr>
             <a:r>
               <a:rPr b="0" lang="es-ES" sz="1000" spc="-1" strike="noStrike">
@@ -2980,6 +3022,7 @@
               <a:spcAft>
                 <a:spcPts val="601"/>
               </a:spcAft>
+              <a:buNone/>
             </a:pPr>
             <a:r>
               <a:rPr b="0" lang="es-ES" sz="1200" spc="-1" strike="noStrike" cap="small">
@@ -3003,6 +3046,7 @@
               <a:spcAft>
                 <a:spcPts val="601"/>
               </a:spcAft>
+              <a:buNone/>
             </a:pPr>
             <a:r>
               <a:rPr b="0" lang="es-ES" sz="1200" spc="-1" strike="noStrike" cap="small">
@@ -3023,6 +3067,7 @@
               <a:lnSpc>
                 <a:spcPct val="100000"/>
               </a:lnSpc>
+              <a:buNone/>
             </a:pPr>
             <a:endParaRPr b="0" lang="en-US" sz="1200" spc="-1" strike="noStrike">
               <a:latin typeface="Arial"/>
@@ -3043,7 +3088,7 @@
         <p:spPr>
           <a:xfrm>
             <a:off x="5640840" y="2841480"/>
-            <a:ext cx="1510560" cy="1475640"/>
+            <a:ext cx="1510200" cy="1475280"/>
           </a:xfrm>
           <a:prstGeom prst="rect">
             <a:avLst/>
@@ -3062,7 +3107,7 @@
         <p:spPr>
           <a:xfrm>
             <a:off x="916920" y="10111320"/>
-            <a:ext cx="5759280" cy="979920"/>
+            <a:ext cx="5758920" cy="979920"/>
           </a:xfrm>
           <a:prstGeom prst="rect">
             <a:avLst/>
@@ -3087,6 +3132,7 @@
               <a:lnSpc>
                 <a:spcPct val="150000"/>
               </a:lnSpc>
+              <a:buNone/>
             </a:pPr>
             <a:r>
               <a:rPr b="0" lang="es-ES" sz="1100" spc="-1" strike="noStrike">
@@ -3107,6 +3153,7 @@
               <a:lnSpc>
                 <a:spcPct val="150000"/>
               </a:lnSpc>
+              <a:buNone/>
             </a:pPr>
             <a:r>
               <a:rPr b="0" lang="es-ES" sz="1400" spc="-1" strike="noStrike">
@@ -3147,6 +3194,7 @@
               <a:lnSpc>
                 <a:spcPct val="150000"/>
               </a:lnSpc>
+              <a:buNone/>
             </a:pPr>
             <a:r>
               <a:rPr b="0" lang="es-ES" sz="1400" spc="-1" strike="noStrike">
@@ -3220,7 +3268,7 @@
         <p:spPr>
           <a:xfrm>
             <a:off x="3837600" y="1248840"/>
-            <a:ext cx="718560" cy="502560"/>
+            <a:ext cx="718200" cy="502200"/>
           </a:xfrm>
           <a:prstGeom prst="rect">
             <a:avLst/>
@@ -3256,7 +3304,7 @@
         <p:spPr>
           <a:xfrm>
             <a:off x="3837600" y="719280"/>
-            <a:ext cx="718560" cy="10798560"/>
+            <a:ext cx="718200" cy="10798200"/>
           </a:xfrm>
           <a:prstGeom prst="rect">
             <a:avLst/>
@@ -3285,7 +3333,7 @@
         <p:spPr>
           <a:xfrm>
             <a:off x="3800160" y="1331280"/>
-            <a:ext cx="793440" cy="333000"/>
+            <a:ext cx="793080" cy="333000"/>
           </a:xfrm>
           <a:prstGeom prst="rect">
             <a:avLst/>
@@ -3310,6 +3358,7 @@
               <a:lnSpc>
                 <a:spcPct val="100000"/>
               </a:lnSpc>
+              <a:buNone/>
             </a:pPr>
             <a:r>
               <a:rPr b="0" lang="es-ES" sz="800" spc="-1" strike="noStrike">
@@ -3336,7 +3385,7 @@
         <p:spPr>
           <a:xfrm>
             <a:off x="3837600" y="2294640"/>
-            <a:ext cx="718560" cy="250560"/>
+            <a:ext cx="718200" cy="250200"/>
           </a:xfrm>
           <a:prstGeom prst="rect">
             <a:avLst/>
@@ -3372,7 +3421,7 @@
         <p:spPr>
           <a:xfrm>
             <a:off x="3800160" y="2294640"/>
-            <a:ext cx="793440" cy="272160"/>
+            <a:ext cx="793080" cy="272160"/>
           </a:xfrm>
           <a:prstGeom prst="rect">
             <a:avLst/>
@@ -3397,6 +3446,7 @@
               <a:lnSpc>
                 <a:spcPct val="100000"/>
               </a:lnSpc>
+              <a:buNone/>
             </a:pPr>
             <a:r>
               <a:rPr b="1" lang="es-ES" sz="1200" spc="-1" strike="noStrike">
@@ -3423,7 +3473,7 @@
         <p:spPr>
           <a:xfrm rot="16200000">
             <a:off x="448200" y="6348600"/>
-            <a:ext cx="7497000" cy="576360"/>
+            <a:ext cx="7496640" cy="576360"/>
           </a:xfrm>
           <a:prstGeom prst="rect">
             <a:avLst/>
@@ -3451,6 +3501,7 @@
               <a:spcAft>
                 <a:spcPts val="1199"/>
               </a:spcAft>
+              <a:buNone/>
             </a:pPr>
             <a:r>
               <a:rPr b="0" lang="es-ES" sz="1600" spc="-1" strike="noStrike">
@@ -3477,7 +3528,7 @@
         <p:spPr>
           <a:xfrm>
             <a:off x="3841920" y="10477440"/>
-            <a:ext cx="718560" cy="502560"/>
+            <a:ext cx="718200" cy="502200"/>
           </a:xfrm>
           <a:prstGeom prst="rect">
             <a:avLst/>
@@ -3520,7 +3571,7 @@
         <p:spPr>
           <a:xfrm>
             <a:off x="3996720" y="10602360"/>
-            <a:ext cx="417600" cy="252720"/>
+            <a:ext cx="417240" cy="252360"/>
           </a:xfrm>
           <a:prstGeom prst="rect">
             <a:avLst/>
@@ -3579,8 +3630,8 @@
         </p:blipFill>
         <p:spPr>
           <a:xfrm>
-            <a:off x="1926360" y="1249560"/>
-            <a:ext cx="5254560" cy="3796920"/>
+            <a:off x="1926360" y="1105560"/>
+            <a:ext cx="5254200" cy="3796560"/>
           </a:xfrm>
           <a:prstGeom prst="rect">
             <a:avLst/>
@@ -3599,7 +3650,7 @@
         <p:spPr>
           <a:xfrm>
             <a:off x="710640" y="719640"/>
-            <a:ext cx="7630560" cy="10798560"/>
+            <a:ext cx="7630200" cy="10798200"/>
           </a:xfrm>
           <a:prstGeom prst="rect">
             <a:avLst/>
@@ -3627,8 +3678,8 @@
         </p:nvSpPr>
         <p:spPr>
           <a:xfrm>
-            <a:off x="1926360" y="5486400"/>
-            <a:ext cx="5254560" cy="3814920"/>
+            <a:off x="1926360" y="5221440"/>
+            <a:ext cx="5254200" cy="3814560"/>
           </a:xfrm>
           <a:prstGeom prst="rect">
             <a:avLst/>
@@ -3653,6 +3704,7 @@
               <a:lnSpc>
                 <a:spcPct val="100000"/>
               </a:lnSpc>
+              <a:buNone/>
             </a:pPr>
             <a:r>
               <a:rPr b="0" lang="es-ES" sz="1100" spc="-1" strike="noStrike">
@@ -3662,7 +3714,7 @@
                 <a:latin typeface="Arial"/>
                 <a:ea typeface="DejaVu Sans"/>
               </a:rPr>
-              <a:t>En este trabajo se presenta una búsqueda de partículas de materia oscura producidas en asociación con uno o dos quarks top, mediante el estudio del canal de decaimiento dileptónico de ambos modos de producción. Este análisis se llevó a cabo considerando los 137.1 fb-1 de colisiones protón-protón recopilados por el detector CMS durante la  II del LHC, en un centro de energía de masa de sqrt(s) = 13 TeV. Es la primera vez que se realiza una búsqueda de este tipo que combina los modelos single top y ttbar+DM considerando este estado final. No se han encontrado pruebas de la existencia de materia oscura, pero se extrajeron los límites superiores de la sección transversal de producción de diferentes modelos de señales, lo que nos permitió lograr una exclusión esperada (observada) para los mediadores escalares y pseudoescalares hasta a 215 (180) y 250 (220) GeV respectivamente. Por lo tanto, los límites de exclusión escalar se mejoraron en un factor de 2 con respecto a los resultados anteriores publicados en 2016 solo para el modelo ttbar+DM, mientras que se logró por primera vez una exclusión pseudoescalar considerando solo el estado final del dileptón.</a:t>
+              <a:t>En este trabajo se presenta una búsqueda de partículas de materia oscura producidas en asociación con uno o dos quarks top en el estado final dileptónico utilizando técnicas avanzadas de reconstrucción analítica y varios Boosted Decision Trees. Este análisis se ha realizado considerando los 137.1 fb-1 de datos de colisiones protón-protón recopilados por el detector CMS durante la segunda fase de operación del LHC, en un centro de energía de masa de 13 TeV. Esta es la primera vez que se realiza una búsqueda de este tipo que combina los modelos single top y ttbar+materia oscura en este estado final. No se ha encontrado evidencia de la existencia de materia oscura, pero límites superiores de la sección eficaz de producción de la señal se han obtenido considerando diferentes modelos de señales. Se logró obtener una exclusión esperada (observada) para mediadores escalares y pseudoescalares hasta 215 (180) y 250 (220) GeV, respectivamente, con un nivel de confianza del 95%. Por lo tanto, los límites de exclusión escalar se mejoraron en un factor de 3 con respecto a los resultados anteriores obtenidos en 2016 solo para el modelo ttbar+DM, mientras que se logró por primera vez obtener una exclusión pseudoescalar al considerar este estado final.</a:t>
             </a:r>
             <a:endParaRPr b="0" lang="en-US" sz="1100" spc="-1" strike="noStrike">
               <a:latin typeface="Arial"/>
@@ -3673,6 +3725,7 @@
               <a:lnSpc>
                 <a:spcPct val="100000"/>
               </a:lnSpc>
+              <a:buNone/>
             </a:pPr>
             <a:endParaRPr b="0" lang="en-US" sz="1100" spc="-1" strike="noStrike">
               <a:latin typeface="Arial"/>
@@ -3683,6 +3736,7 @@
               <a:lnSpc>
                 <a:spcPct val="100000"/>
               </a:lnSpc>
+              <a:buNone/>
             </a:pPr>
             <a:r>
               <a:rPr b="0" lang="es-ES" sz="1100" spc="-1" strike="noStrike">
@@ -3692,7 +3746,7 @@
                 <a:latin typeface="Arial"/>
                 <a:ea typeface="DejaVu Sans"/>
               </a:rPr>
-              <a:t>A search for dark matter particles produced in association with one or two top quarks is presented in this work, by studying the dilepton decay channel of both production modes. This analysis was done by considering the full 137.1fb-1 of proton-proton collisions data collected by the CMS detector during the Run II of operation of the LHC, at a center of mass energy of sqrt(s) = 13 TeV. This is the first time that such a search combining the single top and ttbar+DM models is performed considering this final state. No evidence for the existence of dark matter have been found, but upper limits on the production cross section of different signal models were extracted, allowing us to achieve an expected (observed) exclusion for both scalar and pseudoscalar mediators up to 215 (180) and 250 (220) GeV respectively. Scalar exclusion limits were therefore improved by a factor of 2 with respect to the previous results published in 2016 for the ttbar+DM model alone, while a pseudoscalar exclusion was achieved for the first time considering the dilepton final state only.</a:t>
+              <a:t>A search for dark matter particles produced in association with one or two top quarks in the dilepton final state using advanced analytic reconstruction techniques and several Boosted Decision Trees is presented in this work. This analysis has been done by considering the full 137.1 fb-1 of proton-proton collisions data collected by the CMS detector during the Run II of operation of the LHC, at a center of mass energy of 13 TeV. This is the first time that such a search combining the single top and ttbar + dark matter models is performed in such a final state. No evidence for the existence of dark matter has been found, but upper limits on the signal strength have been obtained by considering different production models. An expected (observed) exclusion for scalar and pseudoscalar mediators up to 215 (180) and 250 (220) GeV was respectively achieved, at the 95% confidence level. Scalar exclusion limits were therefore improved by a factor of 3 with respect to the previous results obtained in 2016 for the ttbar+DM model alone, while a pseudoscalar exclusion has been achieved for the first time when considering this particular final state.</a:t>
             </a:r>
             <a:endParaRPr b="0" lang="en-US" sz="1100" spc="-1" strike="noStrike">
               <a:latin typeface="Arial"/>
@@ -3703,6 +3757,7 @@
               <a:lnSpc>
                 <a:spcPct val="100000"/>
               </a:lnSpc>
+              <a:buNone/>
             </a:pPr>
             <a:endParaRPr b="0" lang="en-US" sz="1100" spc="-1" strike="noStrike">
               <a:latin typeface="Arial"/>
@@ -3713,6 +3768,7 @@
               <a:lnSpc>
                 <a:spcPct val="100000"/>
               </a:lnSpc>
+              <a:buNone/>
             </a:pPr>
             <a:endParaRPr b="0" lang="en-US" sz="1100" spc="-1" strike="noStrike">
               <a:latin typeface="Arial"/>
@@ -3732,8 +3788,8 @@
         </p:blipFill>
         <p:spPr>
           <a:xfrm>
-            <a:off x="1740960" y="1065240"/>
-            <a:ext cx="1497240" cy="1484640"/>
+            <a:off x="1740960" y="885240"/>
+            <a:ext cx="1496880" cy="1484280"/>
           </a:xfrm>
           <a:prstGeom prst="rect">
             <a:avLst/>
@@ -3755,8 +3811,8 @@
         </p:blipFill>
         <p:spPr>
           <a:xfrm rot="10800000">
-            <a:off x="5874120" y="3767760"/>
-            <a:ext cx="1497240" cy="1484640"/>
+            <a:off x="5874480" y="3624120"/>
+            <a:ext cx="1496880" cy="1484280"/>
           </a:xfrm>
           <a:prstGeom prst="rect">
             <a:avLst/>
@@ -3779,7 +3835,7 @@
         <p:spPr>
           <a:xfrm>
             <a:off x="3560760" y="10606320"/>
-            <a:ext cx="1909800" cy="822960"/>
+            <a:ext cx="1909440" cy="822600"/>
           </a:xfrm>
           <a:prstGeom prst="rect">
             <a:avLst/>

</xml_diff>